<commit_message>
Improved color-average, cropper threads
color-average/cave changed algorithm to slice images
</commit_message>
<xml_diff>
--- a/presentation.pptx
+++ b/presentation.pptx
@@ -5,13 +5,14 @@
     <p:sldMasterId id="2147483648" r:id="rId1"/>
   </p:sldMasterIdLst>
   <p:notesMasterIdLst>
-    <p:notesMasterId r:id="rId6"/>
+    <p:notesMasterId r:id="rId7"/>
   </p:notesMasterIdLst>
   <p:sldIdLst>
     <p:sldId id="256" r:id="rId2"/>
     <p:sldId id="257" r:id="rId3"/>
     <p:sldId id="258" r:id="rId4"/>
-    <p:sldId id="262" r:id="rId5"/>
+    <p:sldId id="263" r:id="rId5"/>
+    <p:sldId id="262" r:id="rId6"/>
   </p:sldIdLst>
   <p:sldSz cx="12192000" cy="6858000"/>
   <p:notesSz cx="6858000" cy="9144000"/>
@@ -110,6 +111,11 @@
       </a:defRPr>
     </a:lvl9pPr>
   </p:defaultTextStyle>
+  <p:extLst>
+    <p:ext uri="{EFAFB233-063F-42B5-8137-9DF3F51BA10A}">
+      <p15:sldGuideLst xmlns:p15="http://schemas.microsoft.com/office/powerpoint/2012/main"/>
+    </p:ext>
+  </p:extLst>
 </p:presentation>
 </file>
 
@@ -195,7 +201,7 @@
           <a:p>
             <a:fld id="{7C1EEE3D-A9FD-4739-A424-2862C43477F1}" type="datetimeFigureOut">
               <a:rPr lang="en-US" smtClean="0"/>
-              <a:t>2021-11-03</a:t>
+              <a:t>2021-11-04</a:t>
             </a:fld>
             <a:endParaRPr lang="en-US"/>
           </a:p>
@@ -678,7 +684,7 @@
           <a:p>
             <a:fld id="{F87A8D2C-3CD4-411B-8B52-8E8F984E892A}" type="datetimeFigureOut">
               <a:rPr lang="en-US" smtClean="0"/>
-              <a:t>2021-11-03</a:t>
+              <a:t>2021-11-04</a:t>
             </a:fld>
             <a:endParaRPr lang="en-US"/>
           </a:p>
@@ -848,7 +854,7 @@
           <a:p>
             <a:fld id="{F87A8D2C-3CD4-411B-8B52-8E8F984E892A}" type="datetimeFigureOut">
               <a:rPr lang="en-US" smtClean="0"/>
-              <a:t>2021-11-03</a:t>
+              <a:t>2021-11-04</a:t>
             </a:fld>
             <a:endParaRPr lang="en-US"/>
           </a:p>
@@ -1028,7 +1034,7 @@
           <a:p>
             <a:fld id="{F87A8D2C-3CD4-411B-8B52-8E8F984E892A}" type="datetimeFigureOut">
               <a:rPr lang="en-US" smtClean="0"/>
-              <a:t>2021-11-03</a:t>
+              <a:t>2021-11-04</a:t>
             </a:fld>
             <a:endParaRPr lang="en-US"/>
           </a:p>
@@ -1198,7 +1204,7 @@
           <a:p>
             <a:fld id="{F87A8D2C-3CD4-411B-8B52-8E8F984E892A}" type="datetimeFigureOut">
               <a:rPr lang="en-US" smtClean="0"/>
-              <a:t>2021-11-03</a:t>
+              <a:t>2021-11-04</a:t>
             </a:fld>
             <a:endParaRPr lang="en-US"/>
           </a:p>
@@ -1444,7 +1450,7 @@
           <a:p>
             <a:fld id="{F87A8D2C-3CD4-411B-8B52-8E8F984E892A}" type="datetimeFigureOut">
               <a:rPr lang="en-US" smtClean="0"/>
-              <a:t>2021-11-03</a:t>
+              <a:t>2021-11-04</a:t>
             </a:fld>
             <a:endParaRPr lang="en-US"/>
           </a:p>
@@ -1676,7 +1682,7 @@
           <a:p>
             <a:fld id="{F87A8D2C-3CD4-411B-8B52-8E8F984E892A}" type="datetimeFigureOut">
               <a:rPr lang="en-US" smtClean="0"/>
-              <a:t>2021-11-03</a:t>
+              <a:t>2021-11-04</a:t>
             </a:fld>
             <a:endParaRPr lang="en-US"/>
           </a:p>
@@ -2043,7 +2049,7 @@
           <a:p>
             <a:fld id="{F87A8D2C-3CD4-411B-8B52-8E8F984E892A}" type="datetimeFigureOut">
               <a:rPr lang="en-US" smtClean="0"/>
-              <a:t>2021-11-03</a:t>
+              <a:t>2021-11-04</a:t>
             </a:fld>
             <a:endParaRPr lang="en-US"/>
           </a:p>
@@ -2161,7 +2167,7 @@
           <a:p>
             <a:fld id="{F87A8D2C-3CD4-411B-8B52-8E8F984E892A}" type="datetimeFigureOut">
               <a:rPr lang="en-US" smtClean="0"/>
-              <a:t>2021-11-03</a:t>
+              <a:t>2021-11-04</a:t>
             </a:fld>
             <a:endParaRPr lang="en-US"/>
           </a:p>
@@ -2256,7 +2262,7 @@
           <a:p>
             <a:fld id="{F87A8D2C-3CD4-411B-8B52-8E8F984E892A}" type="datetimeFigureOut">
               <a:rPr lang="en-US" smtClean="0"/>
-              <a:t>2021-11-03</a:t>
+              <a:t>2021-11-04</a:t>
             </a:fld>
             <a:endParaRPr lang="en-US"/>
           </a:p>
@@ -2533,7 +2539,7 @@
           <a:p>
             <a:fld id="{F87A8D2C-3CD4-411B-8B52-8E8F984E892A}" type="datetimeFigureOut">
               <a:rPr lang="en-US" smtClean="0"/>
-              <a:t>2021-11-03</a:t>
+              <a:t>2021-11-04</a:t>
             </a:fld>
             <a:endParaRPr lang="en-US"/>
           </a:p>
@@ -2786,7 +2792,7 @@
           <a:p>
             <a:fld id="{F87A8D2C-3CD4-411B-8B52-8E8F984E892A}" type="datetimeFigureOut">
               <a:rPr lang="en-US" smtClean="0"/>
-              <a:t>2021-11-03</a:t>
+              <a:t>2021-11-04</a:t>
             </a:fld>
             <a:endParaRPr lang="en-US"/>
           </a:p>
@@ -2999,7 +3005,7 @@
           <a:p>
             <a:fld id="{F87A8D2C-3CD4-411B-8B52-8E8F984E892A}" type="datetimeFigureOut">
               <a:rPr lang="en-US" smtClean="0"/>
-              <a:t>2021-11-03</a:t>
+              <a:t>2021-11-04</a:t>
             </a:fld>
             <a:endParaRPr lang="en-US"/>
           </a:p>
@@ -3584,14 +3590,14 @@
             <p:ph idx="1"/>
             <p:extLst>
               <p:ext uri="{D42A27DB-BD31-4B8C-83A1-F6EECF244321}">
-                <p14:modId xmlns:p14="http://schemas.microsoft.com/office/powerpoint/2010/main" val="581725668"/>
+                <p14:modId xmlns:p14="http://schemas.microsoft.com/office/powerpoint/2010/main" val="2799845927"/>
               </p:ext>
             </p:extLst>
           </p:nvPr>
         </p:nvGraphicFramePr>
         <p:xfrm>
           <a:off x="838200" y="1825625"/>
-          <a:ext cx="10515600" cy="3672840"/>
+          <a:ext cx="10515600" cy="4312920"/>
         </p:xfrm>
         <a:graphic>
           <a:graphicData uri="http://schemas.openxmlformats.org/drawingml/2006/table">
@@ -3880,6 +3886,46 @@
                   <a:tcPr/>
                 </a:tc>
               </a:tr>
+              <a:tr h="370840">
+                <a:tc>
+                  <a:txBody>
+                    <a:bodyPr/>
+                    <a:lstStyle/>
+                    <a:p>
+                      <a:r>
+                        <a:rPr lang="en-US" dirty="0" smtClean="0"/>
+                        <a:t>Cave.py</a:t>
+                      </a:r>
+                      <a:endParaRPr lang="en-US" dirty="0"/>
+                    </a:p>
+                  </a:txBody>
+                  <a:tcPr/>
+                </a:tc>
+                <a:tc>
+                  <a:txBody>
+                    <a:bodyPr/>
+                    <a:lstStyle/>
+                    <a:p>
+                      <a:r>
+                        <a:rPr lang="en-US" dirty="0" err="1" smtClean="0"/>
+                        <a:t>Taio</a:t>
+                      </a:r>
+                      <a:r>
+                        <a:rPr lang="en-US" baseline="0" dirty="0" smtClean="0"/>
+                        <a:t> alternative, CBIR method by getting the color average of image tiles</a:t>
+                      </a:r>
+                    </a:p>
+                    <a:p>
+                      <a:r>
+                        <a:rPr lang="en-US" baseline="0" dirty="0" smtClean="0"/>
+                        <a:t>Benefits from little but unique dataset, a bit slower</a:t>
+                      </a:r>
+                      <a:endParaRPr lang="en-US" dirty="0" smtClean="0"/>
+                    </a:p>
+                  </a:txBody>
+                  <a:tcPr/>
+                </a:tc>
+              </a:tr>
             </a:tbl>
           </a:graphicData>
         </a:graphic>
@@ -3892,7 +3938,7 @@
         </p:nvSpPr>
         <p:spPr>
           <a:xfrm>
-            <a:off x="838200" y="5980670"/>
+            <a:off x="838200" y="6153664"/>
             <a:ext cx="10515600" cy="370703"/>
           </a:xfrm>
           <a:prstGeom prst="rect">
@@ -4084,6 +4130,134 @@
 </file>
 
 <file path=ppt/slides/slide4.xml><?xml version="1.0" encoding="utf-8"?>
+<p:sld xmlns:a="http://schemas.openxmlformats.org/drawingml/2006/main" xmlns:r="http://schemas.openxmlformats.org/officeDocument/2006/relationships" xmlns:p="http://schemas.openxmlformats.org/presentationml/2006/main">
+  <p:cSld>
+    <p:spTree>
+      <p:nvGrpSpPr>
+        <p:cNvPr id="1" name=""/>
+        <p:cNvGrpSpPr/>
+        <p:nvPr/>
+      </p:nvGrpSpPr>
+      <p:grpSpPr>
+        <a:xfrm>
+          <a:off x="0" y="0"/>
+          <a:ext cx="0" cy="0"/>
+          <a:chOff x="0" y="0"/>
+          <a:chExt cx="0" cy="0"/>
+        </a:xfrm>
+      </p:grpSpPr>
+      <p:sp>
+        <p:nvSpPr>
+          <p:cNvPr id="2" name="Title 1"/>
+          <p:cNvSpPr>
+            <a:spLocks noGrp="1"/>
+          </p:cNvSpPr>
+          <p:nvPr>
+            <p:ph type="title"/>
+          </p:nvPr>
+        </p:nvSpPr>
+        <p:spPr/>
+        <p:txBody>
+          <a:bodyPr/>
+          <a:lstStyle/>
+          <a:p>
+            <a:r>
+              <a:rPr lang="en-US" dirty="0" smtClean="0"/>
+              <a:t>cave.py</a:t>
+            </a:r>
+            <a:endParaRPr lang="en-US" dirty="0"/>
+          </a:p>
+        </p:txBody>
+      </p:sp>
+      <p:sp>
+        <p:nvSpPr>
+          <p:cNvPr id="3" name="Content Placeholder 2"/>
+          <p:cNvSpPr>
+            <a:spLocks noGrp="1"/>
+          </p:cNvSpPr>
+          <p:nvPr>
+            <p:ph idx="1"/>
+          </p:nvPr>
+        </p:nvSpPr>
+        <p:spPr/>
+        <p:txBody>
+          <a:bodyPr/>
+          <a:lstStyle/>
+          <a:p>
+            <a:r>
+              <a:rPr lang="en-US" dirty="0" smtClean="0"/>
+              <a:t>Slice images to (256/16) tiles, and get the average color per tile of an image</a:t>
+            </a:r>
+          </a:p>
+          <a:p>
+            <a:pPr lvl="1"/>
+            <a:r>
+              <a:rPr lang="en-US" dirty="0" err="1" smtClean="0"/>
+              <a:t>Rgb</a:t>
+            </a:r>
+            <a:r>
+              <a:rPr lang="en-US" dirty="0" smtClean="0"/>
+              <a:t> color is converted using pairing function</a:t>
+            </a:r>
+          </a:p>
+          <a:p>
+            <a:pPr lvl="2"/>
+            <a:r>
+              <a:rPr lang="en-US" dirty="0" smtClean="0"/>
+              <a:t>Alleviates the average being the same for different color (30,0,0) has the same average to (10,10,10)</a:t>
+            </a:r>
+          </a:p>
+          <a:p>
+            <a:pPr lvl="2"/>
+            <a:r>
+              <a:rPr lang="en-US" dirty="0" smtClean="0"/>
+              <a:t>Ex : (30,20,30) &gt; (pair(30,1), pair(30,2), pair(30,3)) &gt; (497,255,564)</a:t>
+            </a:r>
+          </a:p>
+          <a:p>
+            <a:pPr lvl="2"/>
+            <a:r>
+              <a:rPr lang="en-US" dirty="0"/>
+              <a:t>Then average it to </a:t>
+            </a:r>
+            <a:r>
+              <a:rPr lang="en-US" dirty="0" smtClean="0"/>
+              <a:t>438.6666666666667</a:t>
+            </a:r>
+          </a:p>
+          <a:p>
+            <a:r>
+              <a:rPr lang="en-US" dirty="0" smtClean="0"/>
+              <a:t>Model is created from a set of images separated by character name and saved with pickle.</a:t>
+            </a:r>
+          </a:p>
+          <a:p>
+            <a:r>
+              <a:rPr lang="en-US" dirty="0" smtClean="0"/>
+              <a:t>Can be slower or faster than </a:t>
+            </a:r>
+            <a:r>
+              <a:rPr lang="en-US" dirty="0" err="1" smtClean="0"/>
+              <a:t>taio</a:t>
+            </a:r>
+            <a:endParaRPr lang="en-US" dirty="0"/>
+          </a:p>
+        </p:txBody>
+      </p:sp>
+    </p:spTree>
+    <p:extLst>
+      <p:ext uri="{BB962C8B-B14F-4D97-AF65-F5344CB8AC3E}">
+        <p14:creationId xmlns:p14="http://schemas.microsoft.com/office/powerpoint/2010/main" val="1094514111"/>
+      </p:ext>
+    </p:extLst>
+  </p:cSld>
+  <p:clrMapOvr>
+    <a:masterClrMapping/>
+  </p:clrMapOvr>
+</p:sld>
+</file>
+
+<file path=ppt/slides/slide5.xml><?xml version="1.0" encoding="utf-8"?>
 <p:sld xmlns:a="http://schemas.openxmlformats.org/drawingml/2006/main" xmlns:r="http://schemas.openxmlformats.org/officeDocument/2006/relationships" xmlns:p="http://schemas.openxmlformats.org/presentationml/2006/main">
   <p:cSld>
     <p:spTree>

</xml_diff>